<commit_message>
update admission page style
</commit_message>
<xml_diff>
--- a/Internship Presentation.pptx
+++ b/Internship Presentation.pptx
@@ -328,7 +328,7 @@
           <a:p>
             <a:fld id="{373E9597-6F13-4AD2-818F-A3E3DAA2519F}" type="datetimeFigureOut">
               <a:rPr lang="en-IN" smtClean="0"/>
-              <a:t>28-05-2020</a:t>
+              <a:t>29-05-2020</a:t>
             </a:fld>
             <a:endParaRPr lang="en-IN"/>
           </a:p>
@@ -493,7 +493,7 @@
           <a:p>
             <a:fld id="{373E9597-6F13-4AD2-818F-A3E3DAA2519F}" type="datetimeFigureOut">
               <a:rPr lang="en-IN" smtClean="0"/>
-              <a:t>28-05-2020</a:t>
+              <a:t>29-05-2020</a:t>
             </a:fld>
             <a:endParaRPr lang="en-IN"/>
           </a:p>
@@ -668,7 +668,7 @@
           <a:p>
             <a:fld id="{373E9597-6F13-4AD2-818F-A3E3DAA2519F}" type="datetimeFigureOut">
               <a:rPr lang="en-IN" smtClean="0"/>
-              <a:t>28-05-2020</a:t>
+              <a:t>29-05-2020</a:t>
             </a:fld>
             <a:endParaRPr lang="en-IN"/>
           </a:p>
@@ -833,7 +833,7 @@
           <a:p>
             <a:fld id="{373E9597-6F13-4AD2-818F-A3E3DAA2519F}" type="datetimeFigureOut">
               <a:rPr lang="en-IN" smtClean="0"/>
-              <a:t>28-05-2020</a:t>
+              <a:t>29-05-2020</a:t>
             </a:fld>
             <a:endParaRPr lang="en-IN"/>
           </a:p>
@@ -1074,7 +1074,7 @@
           <a:p>
             <a:fld id="{373E9597-6F13-4AD2-818F-A3E3DAA2519F}" type="datetimeFigureOut">
               <a:rPr lang="en-IN" smtClean="0"/>
-              <a:t>28-05-2020</a:t>
+              <a:t>29-05-2020</a:t>
             </a:fld>
             <a:endParaRPr lang="en-IN"/>
           </a:p>
@@ -1357,7 +1357,7 @@
           <a:p>
             <a:fld id="{373E9597-6F13-4AD2-818F-A3E3DAA2519F}" type="datetimeFigureOut">
               <a:rPr lang="en-IN" smtClean="0"/>
-              <a:t>28-05-2020</a:t>
+              <a:t>29-05-2020</a:t>
             </a:fld>
             <a:endParaRPr lang="en-IN"/>
           </a:p>
@@ -1786,7 +1786,7 @@
           <a:p>
             <a:fld id="{373E9597-6F13-4AD2-818F-A3E3DAA2519F}" type="datetimeFigureOut">
               <a:rPr lang="en-IN" smtClean="0"/>
-              <a:t>28-05-2020</a:t>
+              <a:t>29-05-2020</a:t>
             </a:fld>
             <a:endParaRPr lang="en-IN"/>
           </a:p>
@@ -1899,7 +1899,7 @@
           <a:p>
             <a:fld id="{373E9597-6F13-4AD2-818F-A3E3DAA2519F}" type="datetimeFigureOut">
               <a:rPr lang="en-IN" smtClean="0"/>
-              <a:t>28-05-2020</a:t>
+              <a:t>29-05-2020</a:t>
             </a:fld>
             <a:endParaRPr lang="en-IN"/>
           </a:p>
@@ -1989,7 +1989,7 @@
           <a:p>
             <a:fld id="{373E9597-6F13-4AD2-818F-A3E3DAA2519F}" type="datetimeFigureOut">
               <a:rPr lang="en-IN" smtClean="0"/>
-              <a:t>28-05-2020</a:t>
+              <a:t>29-05-2020</a:t>
             </a:fld>
             <a:endParaRPr lang="en-IN"/>
           </a:p>
@@ -2178,7 +2178,7 @@
           <a:p>
             <a:fld id="{373E9597-6F13-4AD2-818F-A3E3DAA2519F}" type="datetimeFigureOut">
               <a:rPr lang="en-IN" smtClean="0"/>
-              <a:t>28-05-2020</a:t>
+              <a:t>29-05-2020</a:t>
             </a:fld>
             <a:endParaRPr lang="en-IN"/>
           </a:p>
@@ -2496,7 +2496,7 @@
           <a:p>
             <a:fld id="{373E9597-6F13-4AD2-818F-A3E3DAA2519F}" type="datetimeFigureOut">
               <a:rPr lang="en-IN" smtClean="0"/>
-              <a:t>28-05-2020</a:t>
+              <a:t>29-05-2020</a:t>
             </a:fld>
             <a:endParaRPr lang="en-IN"/>
           </a:p>
@@ -2875,7 +2875,7 @@
           <a:p>
             <a:fld id="{373E9597-6F13-4AD2-818F-A3E3DAA2519F}" type="datetimeFigureOut">
               <a:rPr lang="en-IN" smtClean="0"/>
-              <a:t>28-05-2020</a:t>
+              <a:t>29-05-2020</a:t>
             </a:fld>
             <a:endParaRPr lang="en-IN"/>
           </a:p>
@@ -3296,8 +3296,37 @@
                   <a:schemeClr val="tx1"/>
                 </a:solidFill>
               </a:rPr>
-              <a:t>    	:  T.Y. B-Tech, CSE, trimester - IX </a:t>
-            </a:r>
+              <a:t>    	</a:t>
+            </a:r>
+            <a:r>
+              <a:rPr lang="en-US" dirty="0" smtClean="0">
+                <a:solidFill>
+                  <a:schemeClr val="tx1"/>
+                </a:solidFill>
+              </a:rPr>
+              <a:t>:  T.Y</a:t>
+            </a:r>
+            <a:r>
+              <a:rPr lang="en-US" dirty="0" smtClean="0">
+                <a:solidFill>
+                  <a:schemeClr val="tx1"/>
+                </a:solidFill>
+              </a:rPr>
+              <a:t>. B-Tech, CSE, trimester - </a:t>
+            </a:r>
+            <a:r>
+              <a:rPr lang="en-US" dirty="0" smtClean="0">
+                <a:solidFill>
+                  <a:schemeClr val="tx1"/>
+                </a:solidFill>
+              </a:rPr>
+              <a:t>IX</a:t>
+            </a:r>
+            <a:endParaRPr lang="en-US" dirty="0" smtClean="0">
+              <a:solidFill>
+                <a:schemeClr val="tx1"/>
+              </a:solidFill>
+            </a:endParaRPr>
           </a:p>
           <a:p>
             <a:pPr algn="just"/>
@@ -3668,16 +3697,21 @@
             <a:pPr algn="just"/>
             <a:r>
               <a:rPr lang="en-US" dirty="0" smtClean="0"/>
-              <a:t>Designed the students list page which consists a list of all the students registered and given options to modify the details, make admission, print receipt and delete the record to eac</a:t>
-            </a:r>
-            <a:r>
-              <a:rPr lang="en-US" dirty="0"/>
-              <a:t>h</a:t>
+              <a:t>Designed the students list page which consists a list of all the students registered and given options to </a:t>
             </a:r>
             <a:r>
               <a:rPr lang="en-US" dirty="0" smtClean="0"/>
-              <a:t> student.</a:t>
-            </a:r>
+              <a:t>each student to modify </a:t>
+            </a:r>
+            <a:r>
+              <a:rPr lang="en-US" dirty="0" smtClean="0"/>
+              <a:t>the details, make admission, print receipt and delete the </a:t>
+            </a:r>
+            <a:r>
+              <a:rPr lang="en-US" dirty="0" smtClean="0"/>
+              <a:t>record.</a:t>
+            </a:r>
+            <a:endParaRPr lang="en-US" dirty="0" smtClean="0"/>
           </a:p>
           <a:p>
             <a:pPr algn="just"/>
@@ -3914,6 +3948,7 @@
               <a:rPr lang="en-US" dirty="0" smtClean="0"/>
               <a:t>.</a:t>
             </a:r>
+            <a:endParaRPr lang="en-US" dirty="0" smtClean="0"/>
           </a:p>
           <a:p>
             <a:pPr algn="just"/>
@@ -3980,7 +4015,7 @@
         </p:nvSpPr>
         <p:spPr>
           <a:xfrm>
-            <a:off x="225236" y="6151743"/>
+            <a:off x="480263" y="5949280"/>
             <a:ext cx="5486400" cy="566738"/>
           </a:xfrm>
         </p:spPr>
@@ -3992,10 +4027,20 @@
           <a:p>
             <a:pPr algn="l"/>
             <a:r>
-              <a:rPr lang="en-US" dirty="0" smtClean="0"/>
+              <a:rPr lang="en-US" sz="1800" dirty="0" smtClean="0">
+                <a:solidFill>
+                  <a:schemeClr val="tx1"/>
+                </a:solidFill>
+                <a:latin typeface="+mn-lt"/>
+              </a:rPr>
               <a:t>Sign-Up Page</a:t>
             </a:r>
-            <a:endParaRPr lang="en-IN" dirty="0"/>
+            <a:endParaRPr lang="en-IN" sz="1800" dirty="0">
+              <a:solidFill>
+                <a:schemeClr val="tx1"/>
+              </a:solidFill>
+              <a:latin typeface="+mn-lt"/>
+            </a:endParaRPr>
           </a:p>
         </p:txBody>
       </p:sp>
@@ -4022,8 +4067,8 @@
         </p:blipFill>
         <p:spPr bwMode="auto">
           <a:xfrm>
-            <a:off x="251520" y="545201"/>
-            <a:ext cx="7920881" cy="5587007"/>
+            <a:off x="456421" y="836712"/>
+            <a:ext cx="7657913" cy="5295496"/>
           </a:xfrm>
           <a:prstGeom prst="rect">
             <a:avLst/>
@@ -4608,7 +4653,15 @@
             <a:pPr algn="just"/>
             <a:r>
               <a:rPr lang="en-US" dirty="0" smtClean="0"/>
-              <a:t>It consists of login form where admin can login.</a:t>
+              <a:t>It consists of login form where </a:t>
+            </a:r>
+            <a:r>
+              <a:rPr lang="en-US" dirty="0"/>
+              <a:t>administrator can </a:t>
+            </a:r>
+            <a:r>
+              <a:rPr lang="en-US" dirty="0" smtClean="0"/>
+              <a:t>login.</a:t>
             </a:r>
           </a:p>
           <a:p>
@@ -5075,7 +5128,7 @@
         <p:spPr/>
         <p:txBody>
           <a:bodyPr>
-            <a:normAutofit fontScale="92500"/>
+            <a:normAutofit lnSpcReduction="10000"/>
           </a:bodyPr>
           <a:lstStyle/>
           <a:p>
@@ -5118,28 +5171,47 @@
             <a:pPr lvl="0" fontAlgn="base"/>
             <a:r>
               <a:rPr lang="en-IN" dirty="0"/>
-              <a:t>Used AJAX to exchange the data from the </a:t>
-            </a:r>
-            <a:r>
-              <a:rPr lang="en-IN" dirty="0" err="1"/>
-              <a:t>php</a:t>
-            </a:r>
+              <a:t>Used AJAX to exchange the data </a:t>
+            </a:r>
+            <a:r>
+              <a:rPr lang="en-IN" dirty="0" smtClean="0"/>
+              <a:t>between the front-end and the back-end</a:t>
+            </a:r>
+            <a:endParaRPr lang="en-IN" dirty="0"/>
+          </a:p>
+          <a:p>
+            <a:pPr lvl="0" fontAlgn="base"/>
             <a:r>
               <a:rPr lang="en-IN" dirty="0"/>
-              <a:t> and the database.</a:t>
-            </a:r>
-          </a:p>
-          <a:p>
-            <a:pPr lvl="0" fontAlgn="base"/>
+              <a:t>Used PHP </a:t>
+            </a:r>
+            <a:r>
+              <a:rPr lang="en-IN" dirty="0" smtClean="0"/>
+              <a:t>and MySQL to </a:t>
+            </a:r>
             <a:r>
               <a:rPr lang="en-IN" dirty="0"/>
-              <a:t>Used PHP to insert data into the database and perform operations on the data</a:t>
-            </a:r>
-          </a:p>
-          <a:p>
+              <a:t>insert </a:t>
+            </a:r>
+            <a:r>
+              <a:rPr lang="en-IN" dirty="0" smtClean="0"/>
+              <a:t>and update data </a:t>
+            </a:r>
             <a:r>
               <a:rPr lang="en-IN" dirty="0"/>
-              <a:t>Used MySQL to create database to store data and perform various operations on it.</a:t>
+              <a:t>into the database and perform </a:t>
+            </a:r>
+            <a:r>
+              <a:rPr lang="en-IN" dirty="0" smtClean="0"/>
+              <a:t>various operations </a:t>
+            </a:r>
+            <a:r>
+              <a:rPr lang="en-IN" dirty="0"/>
+              <a:t>on the </a:t>
+            </a:r>
+            <a:r>
+              <a:rPr lang="en-IN" dirty="0" smtClean="0"/>
+              <a:t>data.</a:t>
             </a:r>
             <a:endParaRPr lang="en-IN" dirty="0"/>
           </a:p>
@@ -5200,7 +5272,11 @@
             <a:pPr algn="l"/>
             <a:r>
               <a:rPr lang="en-US" dirty="0" smtClean="0"/>
-              <a:t>Key Learning's till date</a:t>
+              <a:t>Key </a:t>
+            </a:r>
+            <a:r>
+              <a:rPr lang="en-US" dirty="0" smtClean="0"/>
+              <a:t>Learning‘s</a:t>
             </a:r>
             <a:endParaRPr lang="en-IN" dirty="0"/>
           </a:p>
@@ -5224,8 +5300,13 @@
             <a:pPr algn="just"/>
             <a:r>
               <a:rPr lang="en-US" sz="2400" dirty="0" smtClean="0"/>
-              <a:t>Understanding of attributes required to register a student or make an admission for him.</a:t>
-            </a:r>
+              <a:t>Got an idea of </a:t>
+            </a:r>
+            <a:r>
+              <a:rPr lang="en-US" sz="2400" dirty="0" smtClean="0"/>
+              <a:t>how technologies can be used to resolve real world problems.</a:t>
+            </a:r>
+            <a:endParaRPr lang="en-US" sz="2400" dirty="0" smtClean="0"/>
           </a:p>
           <a:p>
             <a:pPr marL="114300" indent="0" algn="just">
@@ -5507,7 +5588,15 @@
             </a:pPr>
             <a:r>
               <a:rPr lang="en-US" sz="2400" dirty="0" smtClean="0"/>
-              <a:t>Learned to make data persistent in MySQL database PHP.</a:t>
+              <a:t>Learned to make data persistent in MySQL database </a:t>
+            </a:r>
+            <a:r>
+              <a:rPr lang="en-US" sz="2400" dirty="0" smtClean="0"/>
+              <a:t>using PHP</a:t>
+            </a:r>
+            <a:r>
+              <a:rPr lang="en-US" sz="2400" dirty="0" smtClean="0"/>
+              <a:t>.</a:t>
             </a:r>
           </a:p>
           <a:p>
@@ -6092,7 +6181,15 @@
             <a:pPr algn="just"/>
             <a:r>
               <a:rPr lang="en-US" dirty="0" smtClean="0"/>
-              <a:t>On click of modify option a page should open to where admin can make changes to the details of the student. </a:t>
+              <a:t>On click of modify option a page should </a:t>
+            </a:r>
+            <a:r>
+              <a:rPr lang="en-US" dirty="0" smtClean="0"/>
+              <a:t>open </a:t>
+            </a:r>
+            <a:r>
+              <a:rPr lang="en-US" dirty="0" smtClean="0"/>
+              <a:t>where admin can make changes to the details of the student. </a:t>
             </a:r>
           </a:p>
           <a:p>
@@ -6114,7 +6211,19 @@
             <a:pPr algn="just"/>
             <a:r>
               <a:rPr lang="en-US" dirty="0" smtClean="0"/>
-              <a:t>On click of Make Admission button a page must open showing the details of the student and options to upload various identification documents.</a:t>
+              <a:t>On click of Make Admission </a:t>
+            </a:r>
+            <a:r>
+              <a:rPr lang="en-US" dirty="0" smtClean="0"/>
+              <a:t>option</a:t>
+            </a:r>
+            <a:r>
+              <a:rPr lang="en-US" dirty="0" smtClean="0"/>
+              <a:t> </a:t>
+            </a:r>
+            <a:r>
+              <a:rPr lang="en-US" dirty="0" smtClean="0"/>
+              <a:t>a page must open showing the details of the student and options to upload various identification documents.</a:t>
             </a:r>
           </a:p>
           <a:p>
@@ -6203,7 +6312,7 @@
         <p:spPr/>
         <p:txBody>
           <a:bodyPr>
-            <a:normAutofit fontScale="92500" lnSpcReduction="20000"/>
+            <a:normAutofit fontScale="92500" lnSpcReduction="10000"/>
           </a:bodyPr>
           <a:lstStyle/>
           <a:p>
@@ -6222,19 +6331,23 @@
             </a:r>
             <a:r>
               <a:rPr lang="en-IN" sz="2000" dirty="0"/>
-              <a:t>a manually operated system where new student is registered manually in a </a:t>
+              <a:t>a manually operated system where new student is registered manually </a:t>
+            </a:r>
+            <a:r>
+              <a:rPr lang="en-IN" sz="2000" dirty="0" smtClean="0"/>
+              <a:t>in a </a:t>
             </a:r>
             <a:r>
               <a:rPr lang="en-IN" sz="2000" dirty="0" smtClean="0"/>
               <a:t>register </a:t>
             </a:r>
             <a:r>
+              <a:rPr lang="en-IN" sz="2000" dirty="0" smtClean="0"/>
+              <a:t>and details are recorded in it. As a result all the data </a:t>
+            </a:r>
+            <a:r>
               <a:rPr lang="en-IN" sz="2000" dirty="0"/>
-              <a:t>where registration no., student name and other details are recorded. </a:t>
-            </a:r>
-            <a:r>
-              <a:rPr lang="en-IN" sz="2000" dirty="0"/>
-              <a:t>The school uses manual system in the process of administration and all its data is maintained in the files. </a:t>
+              <a:t>is maintained in the files. </a:t>
             </a:r>
             <a:endParaRPr lang="en-IN" sz="2000" dirty="0" smtClean="0"/>
           </a:p>
@@ -6314,7 +6427,15 @@
             </a:r>
             <a:r>
               <a:rPr lang="en-IN" sz="2000" dirty="0" smtClean="0"/>
-              <a:t>which will sped up the admission process of the student.</a:t>
+              <a:t>which will </a:t>
+            </a:r>
+            <a:r>
+              <a:rPr lang="en-IN" sz="2000" dirty="0" smtClean="0"/>
+              <a:t>speed </a:t>
+            </a:r>
+            <a:r>
+              <a:rPr lang="en-IN" sz="2000" dirty="0" smtClean="0"/>
+              <a:t>up the admission process of the student.</a:t>
             </a:r>
             <a:endParaRPr lang="en-IN" sz="2000" dirty="0"/>
           </a:p>
@@ -6558,145 +6679,153 @@
         </p:spPr>
         <p:txBody>
           <a:bodyPr>
-            <a:normAutofit fontScale="55000" lnSpcReduction="20000"/>
+            <a:normAutofit fontScale="25000" lnSpcReduction="20000"/>
           </a:bodyPr>
           <a:lstStyle/>
           <a:p>
             <a:r>
-              <a:rPr lang="en-IN" dirty="0"/>
+              <a:rPr lang="en-IN" sz="5200" dirty="0"/>
               <a:t>The sequential phases in Waterfall model are </a:t>
             </a:r>
             <a:r>
-              <a:rPr lang="en-IN" dirty="0" smtClean="0"/>
+              <a:rPr lang="en-IN" sz="5200" dirty="0" smtClean="0"/>
               <a:t>−</a:t>
             </a:r>
           </a:p>
           <a:p>
-            <a:endParaRPr lang="en-IN" dirty="0" smtClean="0"/>
-          </a:p>
-          <a:p>
-            <a:endParaRPr lang="en-IN" dirty="0"/>
+            <a:pPr marL="114300" indent="0">
+              <a:buNone/>
+            </a:pPr>
+            <a:endParaRPr lang="en-IN" sz="5200" dirty="0"/>
           </a:p>
           <a:p>
             <a:pPr lvl="0"/>
             <a:r>
-              <a:rPr lang="en-IN" b="1" dirty="0"/>
+              <a:rPr lang="en-IN" sz="5200" b="1" dirty="0"/>
               <a:t>Requirement Gathering and analysis</a:t>
             </a:r>
             <a:r>
-              <a:rPr lang="en-IN" dirty="0"/>
+              <a:rPr lang="en-IN" sz="5200" dirty="0"/>
               <a:t> − All possible requirements of the system to be developed are captured in this phase and documented in a requirement specification document</a:t>
             </a:r>
             <a:r>
-              <a:rPr lang="en-IN" dirty="0" smtClean="0"/>
+              <a:rPr lang="en-IN" sz="5200" dirty="0" smtClean="0"/>
               <a:t>.</a:t>
             </a:r>
           </a:p>
           <a:p>
             <a:pPr lvl="0"/>
-            <a:endParaRPr lang="en-IN" dirty="0"/>
+            <a:endParaRPr lang="en-IN" sz="5200" dirty="0"/>
           </a:p>
           <a:p>
             <a:pPr lvl="0"/>
             <a:r>
-              <a:rPr lang="en-IN" b="1" dirty="0"/>
+              <a:rPr lang="en-IN" sz="5200" b="1" dirty="0"/>
               <a:t>System Design</a:t>
             </a:r>
             <a:r>
-              <a:rPr lang="en-IN" dirty="0"/>
-              <a:t> − the requirement specifications from first phase are studied in this phase and the system design is prepared. This system design helps in specifying hardware and system requirements and helps in defining the overall system architecture</a:t>
-            </a:r>
-            <a:r>
-              <a:rPr lang="en-IN" dirty="0" smtClean="0"/>
+              <a:rPr lang="en-IN" sz="5200" dirty="0"/>
+              <a:t> − the requirement specifications from first phase are studied in this phase and the system design is prepared. </a:t>
+            </a:r>
+            <a:r>
+              <a:rPr lang="en-IN" sz="5200" dirty="0" smtClean="0"/>
+              <a:t>The system </a:t>
+            </a:r>
+            <a:r>
+              <a:rPr lang="en-IN" sz="5200" dirty="0"/>
+              <a:t>design helps in specifying hardware and system requirements and helps in defining the overall system architecture</a:t>
+            </a:r>
+            <a:r>
+              <a:rPr lang="en-IN" sz="5200" dirty="0" smtClean="0"/>
               <a:t>.</a:t>
             </a:r>
           </a:p>
           <a:p>
             <a:pPr lvl="0"/>
-            <a:endParaRPr lang="en-IN" dirty="0"/>
+            <a:endParaRPr lang="en-IN" sz="5200" dirty="0"/>
           </a:p>
           <a:p>
             <a:pPr lvl="0"/>
             <a:r>
-              <a:rPr lang="en-IN" b="1" dirty="0"/>
+              <a:rPr lang="en-IN" sz="5200" b="1" dirty="0"/>
               <a:t>Implementation</a:t>
             </a:r>
             <a:r>
-              <a:rPr lang="en-IN" dirty="0"/>
+              <a:rPr lang="en-IN" sz="5200" dirty="0"/>
               <a:t> − with inputs from the system design, the system is first developed in small programs called units, which are integrated in the next phase. Each unit is developed and tested for its functionality, which is referred to as Unit Testing</a:t>
             </a:r>
             <a:r>
-              <a:rPr lang="en-IN" dirty="0" smtClean="0"/>
+              <a:rPr lang="en-IN" sz="5200" dirty="0" smtClean="0"/>
               <a:t>.</a:t>
             </a:r>
           </a:p>
           <a:p>
             <a:pPr lvl="0"/>
-            <a:endParaRPr lang="en-IN" dirty="0"/>
+            <a:endParaRPr lang="en-IN" sz="5200" dirty="0"/>
           </a:p>
           <a:p>
             <a:pPr lvl="0"/>
             <a:r>
-              <a:rPr lang="en-IN" b="1" dirty="0"/>
+              <a:rPr lang="en-IN" sz="5200" b="1" dirty="0"/>
               <a:t>Integration and Testing</a:t>
             </a:r>
             <a:r>
-              <a:rPr lang="en-IN" dirty="0"/>
+              <a:rPr lang="en-IN" sz="5200" dirty="0"/>
               <a:t> − All the units developed in the implementation phase are integrated into a system after testing of each unit. Post integration the entire system is tested for any faults and failures</a:t>
             </a:r>
             <a:r>
-              <a:rPr lang="en-IN" dirty="0" smtClean="0"/>
+              <a:rPr lang="en-IN" sz="5200" dirty="0" smtClean="0"/>
               <a:t>.</a:t>
             </a:r>
           </a:p>
           <a:p>
             <a:pPr lvl="0"/>
-            <a:endParaRPr lang="en-IN" dirty="0"/>
+            <a:endParaRPr lang="en-IN" sz="5200" dirty="0"/>
           </a:p>
           <a:p>
             <a:pPr lvl="0"/>
             <a:r>
-              <a:rPr lang="en-IN" b="1" dirty="0"/>
+              <a:rPr lang="en-IN" sz="5200" b="1" dirty="0"/>
               <a:t>Deployment of system</a:t>
             </a:r>
             <a:r>
-              <a:rPr lang="en-IN" dirty="0"/>
+              <a:rPr lang="en-IN" sz="5200" dirty="0"/>
               <a:t> − Once the functional and non-functional testing is done; the product is deployed in the customer environment or released into the market</a:t>
             </a:r>
             <a:r>
-              <a:rPr lang="en-IN" dirty="0" smtClean="0"/>
+              <a:rPr lang="en-IN" sz="5200" dirty="0" smtClean="0"/>
               <a:t>.</a:t>
             </a:r>
           </a:p>
           <a:p>
             <a:pPr lvl="0"/>
-            <a:endParaRPr lang="en-IN" dirty="0"/>
+            <a:endParaRPr lang="en-IN" sz="5200" dirty="0"/>
           </a:p>
           <a:p>
             <a:pPr lvl="0"/>
             <a:r>
-              <a:rPr lang="en-IN" b="1" dirty="0"/>
+              <a:rPr lang="en-IN" sz="5200" b="1" dirty="0"/>
               <a:t>Maintenance</a:t>
             </a:r>
             <a:r>
-              <a:rPr lang="en-IN" dirty="0"/>
+              <a:rPr lang="en-IN" sz="5200" dirty="0"/>
               <a:t> − There are some issues which come up in the client environment. To fix those issues, patches are released. Also to enhance the product some better versions are released. Maintenance is done to deliver these changes in the customer environment</a:t>
             </a:r>
             <a:r>
-              <a:rPr lang="en-IN" dirty="0" smtClean="0"/>
+              <a:rPr lang="en-IN" sz="5200" dirty="0" smtClean="0"/>
               <a:t>.</a:t>
             </a:r>
           </a:p>
           <a:p>
             <a:pPr lvl="0"/>
-            <a:endParaRPr lang="en-IN" dirty="0"/>
-          </a:p>
-          <a:p>
-            <a:r>
-              <a:rPr lang="en-IN" dirty="0"/>
-              <a:t>All these phases are cascaded to each other in which progress is seen as flowing steadily downwards (like a waterfall) through the phases. The next phase is started only after the defined set of goals are achieved for previous phase and it is signed off, so the name "Waterfall Model". In this model, phases do not overlap.</a:t>
-            </a:r>
-            <a:endParaRPr lang="en-IN" dirty="0"/>
+            <a:endParaRPr lang="en-IN" sz="5200" dirty="0"/>
+          </a:p>
+          <a:p>
+            <a:r>
+              <a:rPr lang="en-IN" sz="5200" dirty="0"/>
+              <a:t>All these phases are cascaded to each other in which progress is seen as flowing steadily downwards (like a waterfall) through the phases. </a:t>
+            </a:r>
+            <a:endParaRPr lang="en-IN" sz="2500" dirty="0"/>
           </a:p>
         </p:txBody>
       </p:sp>

</xml_diff>